<commit_message>
Attempt at fixing errors with sequence diagram in developer docs.
</commit_message>
<xml_diff>
--- a/docs/diagrams/GroupSequenceDiagram.pptx
+++ b/docs/diagrams/GroupSequenceDiagram.pptx
@@ -107,6 +107,11 @@
       </a:defRPr>
     </a:lvl9pPr>
   </p:defaultTextStyle>
+  <p:extLst>
+    <p:ext uri="{EFAFB233-063F-42B5-8137-9DF3F51BA10A}">
+      <p15:sldGuideLst xmlns:p15="http://schemas.microsoft.com/office/powerpoint/2012/main"/>
+    </p:ext>
+  </p:extLst>
 </p:presentation>
 </file>
 
@@ -192,7 +197,7 @@
           <a:p>
             <a:fld id="{62511F6D-3957-4073-A6EA-8AA084D57D2E}" type="datetimeFigureOut">
               <a:rPr lang="en-US" smtClean="0"/>
-              <a:t>10/13/2018</a:t>
+              <a:t>10/20/2018</a:t>
             </a:fld>
             <a:endParaRPr lang="en-US"/>
           </a:p>
@@ -256,38 +261,37 @@
           <a:p>
             <a:pPr lvl="0"/>
             <a:r>
-              <a:rPr lang="en-US" smtClean="0"/>
+              <a:rPr lang="en-US"/>
               <a:t>Click to edit Master text styles</a:t>
             </a:r>
           </a:p>
           <a:p>
             <a:pPr lvl="1"/>
             <a:r>
-              <a:rPr lang="en-US" smtClean="0"/>
+              <a:rPr lang="en-US"/>
               <a:t>Second level</a:t>
             </a:r>
           </a:p>
           <a:p>
             <a:pPr lvl="2"/>
             <a:r>
-              <a:rPr lang="en-US" smtClean="0"/>
+              <a:rPr lang="en-US"/>
               <a:t>Third level</a:t>
             </a:r>
           </a:p>
           <a:p>
             <a:pPr lvl="3"/>
             <a:r>
-              <a:rPr lang="en-US" smtClean="0"/>
+              <a:rPr lang="en-US"/>
               <a:t>Fourth level</a:t>
             </a:r>
           </a:p>
           <a:p>
             <a:pPr lvl="4"/>
             <a:r>
-              <a:rPr lang="en-US" smtClean="0"/>
+              <a:rPr lang="en-US"/>
               <a:t>Fifth level</a:t>
             </a:r>
-            <a:endParaRPr lang="en-US"/>
           </a:p>
         </p:txBody>
       </p:sp>
@@ -505,12 +509,8 @@
           <a:lstStyle/>
           <a:p>
             <a:r>
-              <a:rPr lang="en-SG" dirty="0" smtClean="0"/>
-              <a:t>Group Sequence </a:t>
-            </a:r>
-            <a:r>
-              <a:rPr lang="en-SG" dirty="0" smtClean="0"/>
-              <a:t>Diagram</a:t>
+              <a:rPr lang="en-SG" dirty="0"/>
+              <a:t>Group Sequence Diagram</a:t>
             </a:r>
             <a:endParaRPr lang="en-US" dirty="0"/>
           </a:p>
@@ -594,10 +594,9 @@
           </a:lstStyle>
           <a:p>
             <a:r>
-              <a:rPr lang="en-US" smtClean="0"/>
+              <a:rPr lang="en-US"/>
               <a:t>Click to edit Master title style</a:t>
             </a:r>
-            <a:endParaRPr lang="en-US"/>
           </a:p>
         </p:txBody>
       </p:sp>
@@ -659,10 +658,9 @@
           </a:lstStyle>
           <a:p>
             <a:r>
-              <a:rPr lang="en-US" smtClean="0"/>
+              <a:rPr lang="en-US"/>
               <a:t>Click to edit Master subtitle style</a:t>
             </a:r>
-            <a:endParaRPr lang="en-US"/>
           </a:p>
         </p:txBody>
       </p:sp>
@@ -683,7 +681,7 @@
           <a:p>
             <a:fld id="{56380CDC-2C67-42AA-B1DF-B7373BF777ED}" type="datetimeFigureOut">
               <a:rPr lang="en-US" smtClean="0"/>
-              <a:t>10/13/2018</a:t>
+              <a:t>10/20/2018</a:t>
             </a:fld>
             <a:endParaRPr lang="en-US"/>
           </a:p>
@@ -777,10 +775,9 @@
           <a:lstStyle/>
           <a:p>
             <a:r>
-              <a:rPr lang="en-US" smtClean="0"/>
+              <a:rPr lang="en-US"/>
               <a:t>Click to edit Master title style</a:t>
             </a:r>
-            <a:endParaRPr lang="en-US"/>
           </a:p>
         </p:txBody>
       </p:sp>
@@ -801,38 +798,37 @@
           <a:p>
             <a:pPr lvl="0"/>
             <a:r>
-              <a:rPr lang="en-US" smtClean="0"/>
+              <a:rPr lang="en-US"/>
               <a:t>Click to edit Master text styles</a:t>
             </a:r>
           </a:p>
           <a:p>
             <a:pPr lvl="1"/>
             <a:r>
-              <a:rPr lang="en-US" smtClean="0"/>
+              <a:rPr lang="en-US"/>
               <a:t>Second level</a:t>
             </a:r>
           </a:p>
           <a:p>
             <a:pPr lvl="2"/>
             <a:r>
-              <a:rPr lang="en-US" smtClean="0"/>
+              <a:rPr lang="en-US"/>
               <a:t>Third level</a:t>
             </a:r>
           </a:p>
           <a:p>
             <a:pPr lvl="3"/>
             <a:r>
-              <a:rPr lang="en-US" smtClean="0"/>
+              <a:rPr lang="en-US"/>
               <a:t>Fourth level</a:t>
             </a:r>
           </a:p>
           <a:p>
             <a:pPr lvl="4"/>
             <a:r>
-              <a:rPr lang="en-US" smtClean="0"/>
+              <a:rPr lang="en-US"/>
               <a:t>Fifth level</a:t>
             </a:r>
-            <a:endParaRPr lang="en-US"/>
           </a:p>
         </p:txBody>
       </p:sp>
@@ -853,7 +849,7 @@
           <a:p>
             <a:fld id="{56380CDC-2C67-42AA-B1DF-B7373BF777ED}" type="datetimeFigureOut">
               <a:rPr lang="en-US" smtClean="0"/>
-              <a:t>10/13/2018</a:t>
+              <a:t>10/20/2018</a:t>
             </a:fld>
             <a:endParaRPr lang="en-US"/>
           </a:p>
@@ -952,10 +948,9 @@
           <a:lstStyle/>
           <a:p>
             <a:r>
-              <a:rPr lang="en-US" smtClean="0"/>
+              <a:rPr lang="en-US"/>
               <a:t>Click to edit Master title style</a:t>
             </a:r>
-            <a:endParaRPr lang="en-US"/>
           </a:p>
         </p:txBody>
       </p:sp>
@@ -981,38 +976,37 @@
           <a:p>
             <a:pPr lvl="0"/>
             <a:r>
-              <a:rPr lang="en-US" smtClean="0"/>
+              <a:rPr lang="en-US"/>
               <a:t>Click to edit Master text styles</a:t>
             </a:r>
           </a:p>
           <a:p>
             <a:pPr lvl="1"/>
             <a:r>
-              <a:rPr lang="en-US" smtClean="0"/>
+              <a:rPr lang="en-US"/>
               <a:t>Second level</a:t>
             </a:r>
           </a:p>
           <a:p>
             <a:pPr lvl="2"/>
             <a:r>
-              <a:rPr lang="en-US" smtClean="0"/>
+              <a:rPr lang="en-US"/>
               <a:t>Third level</a:t>
             </a:r>
           </a:p>
           <a:p>
             <a:pPr lvl="3"/>
             <a:r>
-              <a:rPr lang="en-US" smtClean="0"/>
+              <a:rPr lang="en-US"/>
               <a:t>Fourth level</a:t>
             </a:r>
           </a:p>
           <a:p>
             <a:pPr lvl="4"/>
             <a:r>
-              <a:rPr lang="en-US" smtClean="0"/>
+              <a:rPr lang="en-US"/>
               <a:t>Fifth level</a:t>
             </a:r>
-            <a:endParaRPr lang="en-US"/>
           </a:p>
         </p:txBody>
       </p:sp>
@@ -1033,7 +1027,7 @@
           <a:p>
             <a:fld id="{56380CDC-2C67-42AA-B1DF-B7373BF777ED}" type="datetimeFigureOut">
               <a:rPr lang="en-US" smtClean="0"/>
-              <a:t>10/13/2018</a:t>
+              <a:t>10/20/2018</a:t>
             </a:fld>
             <a:endParaRPr lang="en-US"/>
           </a:p>
@@ -1127,10 +1121,9 @@
           <a:lstStyle/>
           <a:p>
             <a:r>
-              <a:rPr lang="en-US" smtClean="0"/>
+              <a:rPr lang="en-US"/>
               <a:t>Click to edit Master title style</a:t>
             </a:r>
-            <a:endParaRPr lang="en-US"/>
           </a:p>
         </p:txBody>
       </p:sp>
@@ -1151,38 +1144,37 @@
           <a:p>
             <a:pPr lvl="0"/>
             <a:r>
-              <a:rPr lang="en-US" smtClean="0"/>
+              <a:rPr lang="en-US"/>
               <a:t>Click to edit Master text styles</a:t>
             </a:r>
           </a:p>
           <a:p>
             <a:pPr lvl="1"/>
             <a:r>
-              <a:rPr lang="en-US" smtClean="0"/>
+              <a:rPr lang="en-US"/>
               <a:t>Second level</a:t>
             </a:r>
           </a:p>
           <a:p>
             <a:pPr lvl="2"/>
             <a:r>
-              <a:rPr lang="en-US" smtClean="0"/>
+              <a:rPr lang="en-US"/>
               <a:t>Third level</a:t>
             </a:r>
           </a:p>
           <a:p>
             <a:pPr lvl="3"/>
             <a:r>
-              <a:rPr lang="en-US" smtClean="0"/>
+              <a:rPr lang="en-US"/>
               <a:t>Fourth level</a:t>
             </a:r>
           </a:p>
           <a:p>
             <a:pPr lvl="4"/>
             <a:r>
-              <a:rPr lang="en-US" smtClean="0"/>
+              <a:rPr lang="en-US"/>
               <a:t>Fifth level</a:t>
             </a:r>
-            <a:endParaRPr lang="en-US"/>
           </a:p>
         </p:txBody>
       </p:sp>
@@ -1203,7 +1195,7 @@
           <a:p>
             <a:fld id="{56380CDC-2C67-42AA-B1DF-B7373BF777ED}" type="datetimeFigureOut">
               <a:rPr lang="en-US" smtClean="0"/>
-              <a:t>10/13/2018</a:t>
+              <a:t>10/20/2018</a:t>
             </a:fld>
             <a:endParaRPr lang="en-US"/>
           </a:p>
@@ -1306,10 +1298,9 @@
           </a:lstStyle>
           <a:p>
             <a:r>
-              <a:rPr lang="en-US" smtClean="0"/>
+              <a:rPr lang="en-US"/>
               <a:t>Click to edit Master title style</a:t>
             </a:r>
-            <a:endParaRPr lang="en-US"/>
           </a:p>
         </p:txBody>
       </p:sp>
@@ -1426,7 +1417,7 @@
           <a:p>
             <a:pPr lvl="0"/>
             <a:r>
-              <a:rPr lang="en-US" smtClean="0"/>
+              <a:rPr lang="en-US"/>
               <a:t>Click to edit Master text styles</a:t>
             </a:r>
           </a:p>
@@ -1449,7 +1440,7 @@
           <a:p>
             <a:fld id="{56380CDC-2C67-42AA-B1DF-B7373BF777ED}" type="datetimeFigureOut">
               <a:rPr lang="en-US" smtClean="0"/>
-              <a:t>10/13/2018</a:t>
+              <a:t>10/20/2018</a:t>
             </a:fld>
             <a:endParaRPr lang="en-US"/>
           </a:p>
@@ -1543,10 +1534,9 @@
           <a:lstStyle/>
           <a:p>
             <a:r>
-              <a:rPr lang="en-US" smtClean="0"/>
+              <a:rPr lang="en-US"/>
               <a:t>Click to edit Master title style</a:t>
             </a:r>
-            <a:endParaRPr lang="en-US"/>
           </a:p>
         </p:txBody>
       </p:sp>
@@ -1572,38 +1562,37 @@
           <a:p>
             <a:pPr lvl="0"/>
             <a:r>
-              <a:rPr lang="en-US" smtClean="0"/>
+              <a:rPr lang="en-US"/>
               <a:t>Click to edit Master text styles</a:t>
             </a:r>
           </a:p>
           <a:p>
             <a:pPr lvl="1"/>
             <a:r>
-              <a:rPr lang="en-US" smtClean="0"/>
+              <a:rPr lang="en-US"/>
               <a:t>Second level</a:t>
             </a:r>
           </a:p>
           <a:p>
             <a:pPr lvl="2"/>
             <a:r>
-              <a:rPr lang="en-US" smtClean="0"/>
+              <a:rPr lang="en-US"/>
               <a:t>Third level</a:t>
             </a:r>
           </a:p>
           <a:p>
             <a:pPr lvl="3"/>
             <a:r>
-              <a:rPr lang="en-US" smtClean="0"/>
+              <a:rPr lang="en-US"/>
               <a:t>Fourth level</a:t>
             </a:r>
           </a:p>
           <a:p>
             <a:pPr lvl="4"/>
             <a:r>
-              <a:rPr lang="en-US" smtClean="0"/>
+              <a:rPr lang="en-US"/>
               <a:t>Fifth level</a:t>
             </a:r>
-            <a:endParaRPr lang="en-US"/>
           </a:p>
         </p:txBody>
       </p:sp>
@@ -1629,38 +1618,37 @@
           <a:p>
             <a:pPr lvl="0"/>
             <a:r>
-              <a:rPr lang="en-US" smtClean="0"/>
+              <a:rPr lang="en-US"/>
               <a:t>Click to edit Master text styles</a:t>
             </a:r>
           </a:p>
           <a:p>
             <a:pPr lvl="1"/>
             <a:r>
-              <a:rPr lang="en-US" smtClean="0"/>
+              <a:rPr lang="en-US"/>
               <a:t>Second level</a:t>
             </a:r>
           </a:p>
           <a:p>
             <a:pPr lvl="2"/>
             <a:r>
-              <a:rPr lang="en-US" smtClean="0"/>
+              <a:rPr lang="en-US"/>
               <a:t>Third level</a:t>
             </a:r>
           </a:p>
           <a:p>
             <a:pPr lvl="3"/>
             <a:r>
-              <a:rPr lang="en-US" smtClean="0"/>
+              <a:rPr lang="en-US"/>
               <a:t>Fourth level</a:t>
             </a:r>
           </a:p>
           <a:p>
             <a:pPr lvl="4"/>
             <a:r>
-              <a:rPr lang="en-US" smtClean="0"/>
+              <a:rPr lang="en-US"/>
               <a:t>Fifth level</a:t>
             </a:r>
-            <a:endParaRPr lang="en-US"/>
           </a:p>
         </p:txBody>
       </p:sp>
@@ -1681,7 +1669,7 @@
           <a:p>
             <a:fld id="{56380CDC-2C67-42AA-B1DF-B7373BF777ED}" type="datetimeFigureOut">
               <a:rPr lang="en-US" smtClean="0"/>
-              <a:t>10/13/2018</a:t>
+              <a:t>10/20/2018</a:t>
             </a:fld>
             <a:endParaRPr lang="en-US"/>
           </a:p>
@@ -1780,10 +1768,9 @@
           <a:lstStyle/>
           <a:p>
             <a:r>
-              <a:rPr lang="en-US" smtClean="0"/>
+              <a:rPr lang="en-US"/>
               <a:t>Click to edit Master title style</a:t>
             </a:r>
-            <a:endParaRPr lang="en-US"/>
           </a:p>
         </p:txBody>
       </p:sp>
@@ -1846,7 +1833,7 @@
           <a:p>
             <a:pPr lvl="0"/>
             <a:r>
-              <a:rPr lang="en-US" smtClean="0"/>
+              <a:rPr lang="en-US"/>
               <a:t>Click to edit Master text styles</a:t>
             </a:r>
           </a:p>
@@ -1874,38 +1861,37 @@
           <a:p>
             <a:pPr lvl="0"/>
             <a:r>
-              <a:rPr lang="en-US" smtClean="0"/>
+              <a:rPr lang="en-US"/>
               <a:t>Click to edit Master text styles</a:t>
             </a:r>
           </a:p>
           <a:p>
             <a:pPr lvl="1"/>
             <a:r>
-              <a:rPr lang="en-US" smtClean="0"/>
+              <a:rPr lang="en-US"/>
               <a:t>Second level</a:t>
             </a:r>
           </a:p>
           <a:p>
             <a:pPr lvl="2"/>
             <a:r>
-              <a:rPr lang="en-US" smtClean="0"/>
+              <a:rPr lang="en-US"/>
               <a:t>Third level</a:t>
             </a:r>
           </a:p>
           <a:p>
             <a:pPr lvl="3"/>
             <a:r>
-              <a:rPr lang="en-US" smtClean="0"/>
+              <a:rPr lang="en-US"/>
               <a:t>Fourth level</a:t>
             </a:r>
           </a:p>
           <a:p>
             <a:pPr lvl="4"/>
             <a:r>
-              <a:rPr lang="en-US" smtClean="0"/>
+              <a:rPr lang="en-US"/>
               <a:t>Fifth level</a:t>
             </a:r>
-            <a:endParaRPr lang="en-US"/>
           </a:p>
         </p:txBody>
       </p:sp>
@@ -1968,7 +1954,7 @@
           <a:p>
             <a:pPr lvl="0"/>
             <a:r>
-              <a:rPr lang="en-US" smtClean="0"/>
+              <a:rPr lang="en-US"/>
               <a:t>Click to edit Master text styles</a:t>
             </a:r>
           </a:p>
@@ -1996,38 +1982,37 @@
           <a:p>
             <a:pPr lvl="0"/>
             <a:r>
-              <a:rPr lang="en-US" smtClean="0"/>
+              <a:rPr lang="en-US"/>
               <a:t>Click to edit Master text styles</a:t>
             </a:r>
           </a:p>
           <a:p>
             <a:pPr lvl="1"/>
             <a:r>
-              <a:rPr lang="en-US" smtClean="0"/>
+              <a:rPr lang="en-US"/>
               <a:t>Second level</a:t>
             </a:r>
           </a:p>
           <a:p>
             <a:pPr lvl="2"/>
             <a:r>
-              <a:rPr lang="en-US" smtClean="0"/>
+              <a:rPr lang="en-US"/>
               <a:t>Third level</a:t>
             </a:r>
           </a:p>
           <a:p>
             <a:pPr lvl="3"/>
             <a:r>
-              <a:rPr lang="en-US" smtClean="0"/>
+              <a:rPr lang="en-US"/>
               <a:t>Fourth level</a:t>
             </a:r>
           </a:p>
           <a:p>
             <a:pPr lvl="4"/>
             <a:r>
-              <a:rPr lang="en-US" smtClean="0"/>
+              <a:rPr lang="en-US"/>
               <a:t>Fifth level</a:t>
             </a:r>
-            <a:endParaRPr lang="en-US"/>
           </a:p>
         </p:txBody>
       </p:sp>
@@ -2048,7 +2033,7 @@
           <a:p>
             <a:fld id="{56380CDC-2C67-42AA-B1DF-B7373BF777ED}" type="datetimeFigureOut">
               <a:rPr lang="en-US" smtClean="0"/>
-              <a:t>10/13/2018</a:t>
+              <a:t>10/20/2018</a:t>
             </a:fld>
             <a:endParaRPr lang="en-US"/>
           </a:p>
@@ -2142,10 +2127,9 @@
           <a:lstStyle/>
           <a:p>
             <a:r>
-              <a:rPr lang="en-US" smtClean="0"/>
+              <a:rPr lang="en-US"/>
               <a:t>Click to edit Master title style</a:t>
             </a:r>
-            <a:endParaRPr lang="en-US"/>
           </a:p>
         </p:txBody>
       </p:sp>
@@ -2166,7 +2150,7 @@
           <a:p>
             <a:fld id="{56380CDC-2C67-42AA-B1DF-B7373BF777ED}" type="datetimeFigureOut">
               <a:rPr lang="en-US" smtClean="0"/>
-              <a:t>10/13/2018</a:t>
+              <a:t>10/20/2018</a:t>
             </a:fld>
             <a:endParaRPr lang="en-US"/>
           </a:p>
@@ -2261,7 +2245,7 @@
           <a:p>
             <a:fld id="{56380CDC-2C67-42AA-B1DF-B7373BF777ED}" type="datetimeFigureOut">
               <a:rPr lang="en-US" smtClean="0"/>
-              <a:t>10/13/2018</a:t>
+              <a:t>10/20/2018</a:t>
             </a:fld>
             <a:endParaRPr lang="en-US"/>
           </a:p>
@@ -2364,10 +2348,9 @@
           </a:lstStyle>
           <a:p>
             <a:r>
-              <a:rPr lang="en-US" smtClean="0"/>
+              <a:rPr lang="en-US"/>
               <a:t>Click to edit Master title style</a:t>
             </a:r>
-            <a:endParaRPr lang="en-US"/>
           </a:p>
         </p:txBody>
       </p:sp>
@@ -2421,38 +2404,37 @@
           <a:p>
             <a:pPr lvl="0"/>
             <a:r>
-              <a:rPr lang="en-US" smtClean="0"/>
+              <a:rPr lang="en-US"/>
               <a:t>Click to edit Master text styles</a:t>
             </a:r>
           </a:p>
           <a:p>
             <a:pPr lvl="1"/>
             <a:r>
-              <a:rPr lang="en-US" smtClean="0"/>
+              <a:rPr lang="en-US"/>
               <a:t>Second level</a:t>
             </a:r>
           </a:p>
           <a:p>
             <a:pPr lvl="2"/>
             <a:r>
-              <a:rPr lang="en-US" smtClean="0"/>
+              <a:rPr lang="en-US"/>
               <a:t>Third level</a:t>
             </a:r>
           </a:p>
           <a:p>
             <a:pPr lvl="3"/>
             <a:r>
-              <a:rPr lang="en-US" smtClean="0"/>
+              <a:rPr lang="en-US"/>
               <a:t>Fourth level</a:t>
             </a:r>
           </a:p>
           <a:p>
             <a:pPr lvl="4"/>
             <a:r>
-              <a:rPr lang="en-US" smtClean="0"/>
+              <a:rPr lang="en-US"/>
               <a:t>Fifth level</a:t>
             </a:r>
-            <a:endParaRPr lang="en-US"/>
           </a:p>
         </p:txBody>
       </p:sp>
@@ -2515,7 +2497,7 @@
           <a:p>
             <a:pPr lvl="0"/>
             <a:r>
-              <a:rPr lang="en-US" smtClean="0"/>
+              <a:rPr lang="en-US"/>
               <a:t>Click to edit Master text styles</a:t>
             </a:r>
           </a:p>
@@ -2538,7 +2520,7 @@
           <a:p>
             <a:fld id="{56380CDC-2C67-42AA-B1DF-B7373BF777ED}" type="datetimeFigureOut">
               <a:rPr lang="en-US" smtClean="0"/>
-              <a:t>10/13/2018</a:t>
+              <a:t>10/20/2018</a:t>
             </a:fld>
             <a:endParaRPr lang="en-US"/>
           </a:p>
@@ -2641,10 +2623,9 @@
           </a:lstStyle>
           <a:p>
             <a:r>
-              <a:rPr lang="en-US" smtClean="0"/>
+              <a:rPr lang="en-US"/>
               <a:t>Click to edit Master title style</a:t>
             </a:r>
-            <a:endParaRPr lang="en-US"/>
           </a:p>
         </p:txBody>
       </p:sp>
@@ -2768,7 +2749,7 @@
           <a:p>
             <a:pPr lvl="0"/>
             <a:r>
-              <a:rPr lang="en-US" smtClean="0"/>
+              <a:rPr lang="en-US"/>
               <a:t>Click to edit Master text styles</a:t>
             </a:r>
           </a:p>
@@ -2791,7 +2772,7 @@
           <a:p>
             <a:fld id="{56380CDC-2C67-42AA-B1DF-B7373BF777ED}" type="datetimeFigureOut">
               <a:rPr lang="en-US" smtClean="0"/>
-              <a:t>10/13/2018</a:t>
+              <a:t>10/20/2018</a:t>
             </a:fld>
             <a:endParaRPr lang="en-US"/>
           </a:p>
@@ -2900,10 +2881,9 @@
           <a:lstStyle/>
           <a:p>
             <a:r>
-              <a:rPr lang="en-US" smtClean="0"/>
+              <a:rPr lang="en-US"/>
               <a:t>Click to edit Master title style</a:t>
             </a:r>
-            <a:endParaRPr lang="en-US"/>
           </a:p>
         </p:txBody>
       </p:sp>
@@ -2934,38 +2914,37 @@
           <a:p>
             <a:pPr lvl="0"/>
             <a:r>
-              <a:rPr lang="en-US" smtClean="0"/>
+              <a:rPr lang="en-US"/>
               <a:t>Click to edit Master text styles</a:t>
             </a:r>
           </a:p>
           <a:p>
             <a:pPr lvl="1"/>
             <a:r>
-              <a:rPr lang="en-US" smtClean="0"/>
+              <a:rPr lang="en-US"/>
               <a:t>Second level</a:t>
             </a:r>
           </a:p>
           <a:p>
             <a:pPr lvl="2"/>
             <a:r>
-              <a:rPr lang="en-US" smtClean="0"/>
+              <a:rPr lang="en-US"/>
               <a:t>Third level</a:t>
             </a:r>
           </a:p>
           <a:p>
             <a:pPr lvl="3"/>
             <a:r>
-              <a:rPr lang="en-US" smtClean="0"/>
+              <a:rPr lang="en-US"/>
               <a:t>Fourth level</a:t>
             </a:r>
           </a:p>
           <a:p>
             <a:pPr lvl="4"/>
             <a:r>
-              <a:rPr lang="en-US" smtClean="0"/>
+              <a:rPr lang="en-US"/>
               <a:t>Fifth level</a:t>
             </a:r>
-            <a:endParaRPr lang="en-US"/>
           </a:p>
         </p:txBody>
       </p:sp>
@@ -3004,7 +2983,7 @@
           <a:p>
             <a:fld id="{56380CDC-2C67-42AA-B1DF-B7373BF777ED}" type="datetimeFigureOut">
               <a:rPr lang="en-US" smtClean="0"/>
-              <a:t>10/13/2018</a:t>
+              <a:t>10/20/2018</a:t>
             </a:fld>
             <a:endParaRPr lang="en-US"/>
           </a:p>
@@ -3417,7 +3396,7 @@
         </p:nvSpPr>
         <p:spPr>
           <a:xfrm>
-            <a:off x="9272660" y="158637"/>
+            <a:off x="9270131" y="154256"/>
             <a:ext cx="1395341" cy="4347781"/>
           </a:xfrm>
           <a:prstGeom prst="roundRect">
@@ -3887,13 +3866,15 @@
       <p:cxnSp>
         <p:nvCxnSpPr>
           <p:cNvPr id="23" name="Straight Arrow Connector 22"/>
-          <p:cNvCxnSpPr/>
+          <p:cNvCxnSpPr>
+            <a:cxnSpLocks/>
+          </p:cNvCxnSpPr>
           <p:nvPr/>
         </p:nvCxnSpPr>
         <p:spPr>
           <a:xfrm>
-            <a:off x="1943101" y="1261999"/>
-            <a:ext cx="1119851" cy="0"/>
+            <a:off x="1088571" y="1258312"/>
+            <a:ext cx="1974381" cy="3687"/>
           </a:xfrm>
           <a:prstGeom prst="straightConnector1">
             <a:avLst/>
@@ -3948,15 +3929,7 @@
                   <a:srgbClr val="0070C0"/>
                 </a:solidFill>
               </a:rPr>
-              <a:t>execute</a:t>
-            </a:r>
-            <a:r>
-              <a:rPr lang="en-US" sz="1100" dirty="0">
-                <a:solidFill>
-                  <a:srgbClr val="0070C0"/>
-                </a:solidFill>
-              </a:rPr>
-              <a:t>(</a:t>
+              <a:t>execute(</a:t>
             </a:r>
           </a:p>
           <a:p>
@@ -3968,11 +3941,6 @@
               </a:rPr>
               <a:t>“group Monday”)</a:t>
             </a:r>
-            <a:endParaRPr lang="en-US" sz="1100" dirty="0">
-              <a:solidFill>
-                <a:srgbClr val="0070C0"/>
-              </a:solidFill>
-            </a:endParaRPr>
           </a:p>
         </p:txBody>
       </p:sp>
@@ -4217,11 +4185,6 @@
               </a:rPr>
               <a:t>()</a:t>
             </a:r>
-            <a:endParaRPr lang="en-US" sz="1000" dirty="0">
-              <a:solidFill>
-                <a:srgbClr val="7030A0"/>
-              </a:solidFill>
-            </a:endParaRPr>
           </a:p>
         </p:txBody>
       </p:sp>
@@ -4266,7 +4229,6 @@
               <a:rPr lang="en-US" sz="1100" dirty="0"/>
               <a:t>(“group Monday”)</a:t>
             </a:r>
-            <a:endParaRPr lang="en-US" sz="1100" dirty="0"/>
           </a:p>
         </p:txBody>
       </p:sp>
@@ -4358,7 +4320,7 @@
         </p:nvSpPr>
         <p:spPr>
           <a:xfrm>
-            <a:off x="9506904" y="2362200"/>
+            <a:off x="9492858" y="713883"/>
             <a:ext cx="841636" cy="300180"/>
           </a:xfrm>
           <a:prstGeom prst="rect">
@@ -4418,9 +4380,9 @@
           <p:nvPr/>
         </p:nvCxnSpPr>
         <p:spPr>
-          <a:xfrm flipH="1">
-            <a:off x="9943631" y="2653306"/>
-            <a:ext cx="3959" cy="1735710"/>
+          <a:xfrm>
+            <a:off x="9940468" y="1056121"/>
+            <a:ext cx="3164" cy="3332895"/>
           </a:xfrm>
           <a:prstGeom prst="line">
             <a:avLst/>
@@ -4456,8 +4418,8 @@
         </p:nvSpPr>
         <p:spPr>
           <a:xfrm>
-            <a:off x="9844666" y="2958107"/>
-            <a:ext cx="168896" cy="775693"/>
+            <a:off x="9844666" y="2958108"/>
+            <a:ext cx="183432" cy="135612"/>
           </a:xfrm>
           <a:prstGeom prst="rect">
             <a:avLst/>
@@ -4584,14 +4546,6 @@
               </a:rPr>
               <a:t>:Group</a:t>
             </a:r>
-            <a:r>
-              <a:rPr lang="en-US" sz="1050" dirty="0">
-                <a:solidFill>
-                  <a:schemeClr val="bg1"/>
-                </a:solidFill>
-              </a:rPr>
-              <a:t/>
-            </a:r>
             <a:br>
               <a:rPr lang="en-US" sz="1050" dirty="0">
                 <a:solidFill>
@@ -4620,7 +4574,7 @@
           <p:cNvPr id="66" name="Straight Arrow Connector 65">
             <a:extLst>
               <a:ext uri="{FF2B5EF4-FFF2-40B4-BE49-F238E27FC236}">
-                <a16:creationId xmlns="" xmlns:a16="http://schemas.microsoft.com/office/drawing/2014/main" id="{39916E2E-195A-4DC8-B025-B05FA87E6796}"/>
+                <a16:creationId xmlns:a16="http://schemas.microsoft.com/office/drawing/2014/main" id="{39916E2E-195A-4DC8-B025-B05FA87E6796}"/>
               </a:ext>
             </a:extLst>
           </p:cNvPr>
@@ -4664,7 +4618,7 @@
           <p:cNvPr id="67" name="Straight Arrow Connector 66">
             <a:extLst>
               <a:ext uri="{FF2B5EF4-FFF2-40B4-BE49-F238E27FC236}">
-                <a16:creationId xmlns="" xmlns:a16="http://schemas.microsoft.com/office/drawing/2014/main" id="{D881596E-177C-4FDC-8E60-CAB90B3D5FAB}"/>
+                <a16:creationId xmlns:a16="http://schemas.microsoft.com/office/drawing/2014/main" id="{D881596E-177C-4FDC-8E60-CAB90B3D5FAB}"/>
               </a:ext>
             </a:extLst>
           </p:cNvPr>
@@ -4708,7 +4662,7 @@
           <p:cNvPr id="69" name="Straight Arrow Connector 68">
             <a:extLst>
               <a:ext uri="{FF2B5EF4-FFF2-40B4-BE49-F238E27FC236}">
-                <a16:creationId xmlns="" xmlns:a16="http://schemas.microsoft.com/office/drawing/2014/main" id="{7C9F21BC-13A9-471F-825A-2621FD36355F}"/>
+                <a16:creationId xmlns:a16="http://schemas.microsoft.com/office/drawing/2014/main" id="{7C9F21BC-13A9-471F-825A-2621FD36355F}"/>
               </a:ext>
             </a:extLst>
           </p:cNvPr>
@@ -4754,7 +4708,7 @@
           <p:cNvPr id="63" name="Straight Arrow Connector 62">
             <a:extLst>
               <a:ext uri="{FF2B5EF4-FFF2-40B4-BE49-F238E27FC236}">
-                <a16:creationId xmlns="" xmlns:a16="http://schemas.microsoft.com/office/drawing/2014/main" id="{7C9F21BC-13A9-471F-825A-2621FD36355F}"/>
+                <a16:creationId xmlns:a16="http://schemas.microsoft.com/office/drawing/2014/main" id="{7C9F21BC-13A9-471F-825A-2621FD36355F}"/>
               </a:ext>
             </a:extLst>
           </p:cNvPr>
@@ -4765,7 +4719,7 @@
         </p:nvCxnSpPr>
         <p:spPr>
           <a:xfrm>
-            <a:off x="8411868" y="3733799"/>
+            <a:off x="8411868" y="3093720"/>
             <a:ext cx="1432799" cy="0"/>
           </a:xfrm>
           <a:prstGeom prst="straightConnector1">
@@ -4973,6 +4927,216 @@
             <a:prstDash val="sysDash"/>
             <a:headEnd type="arrow" w="med" len="med"/>
             <a:tailEnd type="none" w="med" len="med"/>
+          </a:ln>
+        </p:spPr>
+        <p:style>
+          <a:lnRef idx="1">
+            <a:schemeClr val="accent1"/>
+          </a:lnRef>
+          <a:fillRef idx="0">
+            <a:schemeClr val="accent1"/>
+          </a:fillRef>
+          <a:effectRef idx="0">
+            <a:schemeClr val="accent1"/>
+          </a:effectRef>
+          <a:fontRef idx="minor">
+            <a:schemeClr val="tx1"/>
+          </a:fontRef>
+        </p:style>
+      </p:cxnSp>
+      <p:sp>
+        <p:nvSpPr>
+          <p:cNvPr id="38" name="Rectangle 62">
+            <a:extLst>
+              <a:ext uri="{FF2B5EF4-FFF2-40B4-BE49-F238E27FC236}">
+                <a16:creationId xmlns:a16="http://schemas.microsoft.com/office/drawing/2014/main" id="{B8802F0A-4D78-47F0-8DFB-89576A4731C3}"/>
+              </a:ext>
+            </a:extLst>
+          </p:cNvPr>
+          <p:cNvSpPr/>
+          <p:nvPr/>
+        </p:nvSpPr>
+        <p:spPr>
+          <a:xfrm>
+            <a:off x="8557280" y="3220034"/>
+            <a:ext cx="1275707" cy="461538"/>
+          </a:xfrm>
+          <a:prstGeom prst="rect">
+            <a:avLst/>
+          </a:prstGeom>
+          <a:solidFill>
+            <a:srgbClr val="0070C0"/>
+          </a:solidFill>
+          <a:ln w="19050">
+            <a:solidFill>
+              <a:srgbClr val="0070C0"/>
+            </a:solidFill>
+          </a:ln>
+          <a:effectLst/>
+        </p:spPr>
+        <p:style>
+          <a:lnRef idx="1">
+            <a:schemeClr val="accent2"/>
+          </a:lnRef>
+          <a:fillRef idx="2">
+            <a:schemeClr val="accent2"/>
+          </a:fillRef>
+          <a:effectRef idx="1">
+            <a:schemeClr val="accent2"/>
+          </a:effectRef>
+          <a:fontRef idx="minor">
+            <a:schemeClr val="dk1"/>
+          </a:fontRef>
+        </p:style>
+        <p:txBody>
+          <a:bodyPr rtlCol="0" anchor="ctr"/>
+          <a:lstStyle/>
+          <a:p>
+            <a:pPr algn="ctr"/>
+            <a:r>
+              <a:rPr lang="en-US" sz="1200" dirty="0" err="1">
+                <a:solidFill>
+                  <a:schemeClr val="bg1"/>
+                </a:solidFill>
+              </a:rPr>
+              <a:t>result:Command</a:t>
+            </a:r>
+            <a:r>
+              <a:rPr lang="en-US" sz="1200" dirty="0">
+                <a:solidFill>
+                  <a:schemeClr val="bg1"/>
+                </a:solidFill>
+              </a:rPr>
+              <a:t> Result</a:t>
+            </a:r>
+            <a:endParaRPr lang="en-SG" sz="1200" dirty="0">
+              <a:solidFill>
+                <a:schemeClr val="bg1"/>
+              </a:solidFill>
+            </a:endParaRPr>
+          </a:p>
+        </p:txBody>
+      </p:sp>
+      <p:sp>
+        <p:nvSpPr>
+          <p:cNvPr id="39" name="Rectangle 38">
+            <a:extLst>
+              <a:ext uri="{FF2B5EF4-FFF2-40B4-BE49-F238E27FC236}">
+                <a16:creationId xmlns:a16="http://schemas.microsoft.com/office/drawing/2014/main" id="{8E4BE5F9-EB9B-4D28-A1DC-AB55BF8245AE}"/>
+              </a:ext>
+            </a:extLst>
+          </p:cNvPr>
+          <p:cNvSpPr/>
+          <p:nvPr/>
+        </p:nvSpPr>
+        <p:spPr>
+          <a:xfrm>
+            <a:off x="9123781" y="3681572"/>
+            <a:ext cx="152400" cy="171376"/>
+          </a:xfrm>
+          <a:prstGeom prst="rect">
+            <a:avLst/>
+          </a:prstGeom>
+          <a:solidFill>
+            <a:srgbClr val="0070C0"/>
+          </a:solidFill>
+          <a:ln>
+            <a:solidFill>
+              <a:srgbClr val="0070C0"/>
+            </a:solidFill>
+          </a:ln>
+          <a:effectLst/>
+        </p:spPr>
+        <p:style>
+          <a:lnRef idx="1">
+            <a:schemeClr val="accent3"/>
+          </a:lnRef>
+          <a:fillRef idx="2">
+            <a:schemeClr val="accent3"/>
+          </a:fillRef>
+          <a:effectRef idx="1">
+            <a:schemeClr val="accent3"/>
+          </a:effectRef>
+          <a:fontRef idx="minor">
+            <a:schemeClr val="dk1"/>
+          </a:fontRef>
+        </p:style>
+        <p:txBody>
+          <a:bodyPr rtlCol="0" anchor="ctr"/>
+          <a:lstStyle/>
+          <a:p>
+            <a:pPr algn="ctr"/>
+            <a:endParaRPr lang="en-SG" sz="1400"/>
+          </a:p>
+        </p:txBody>
+      </p:sp>
+      <p:cxnSp>
+        <p:nvCxnSpPr>
+          <p:cNvPr id="41" name="Straight Arrow Connector 40">
+            <a:extLst>
+              <a:ext uri="{FF2B5EF4-FFF2-40B4-BE49-F238E27FC236}">
+                <a16:creationId xmlns:a16="http://schemas.microsoft.com/office/drawing/2014/main" id="{D9B939C0-01B7-4875-BD2B-2E3D2CD16665}"/>
+              </a:ext>
+            </a:extLst>
+          </p:cNvPr>
+          <p:cNvCxnSpPr/>
+          <p:nvPr/>
+        </p:nvCxnSpPr>
+        <p:spPr>
+          <a:xfrm>
+            <a:off x="8361781" y="3852948"/>
+            <a:ext cx="762000" cy="0"/>
+          </a:xfrm>
+          <a:prstGeom prst="straightConnector1">
+            <a:avLst/>
+          </a:prstGeom>
+          <a:ln w="19050">
+            <a:solidFill>
+              <a:srgbClr val="0070C0"/>
+            </a:solidFill>
+            <a:prstDash val="sysDash"/>
+            <a:headEnd type="arrow" w="med" len="med"/>
+            <a:tailEnd type="none" w="med" len="med"/>
+          </a:ln>
+        </p:spPr>
+        <p:style>
+          <a:lnRef idx="1">
+            <a:schemeClr val="accent1"/>
+          </a:lnRef>
+          <a:fillRef idx="0">
+            <a:schemeClr val="accent1"/>
+          </a:fillRef>
+          <a:effectRef idx="0">
+            <a:schemeClr val="accent1"/>
+          </a:effectRef>
+          <a:fontRef idx="minor">
+            <a:schemeClr val="tx1"/>
+          </a:fontRef>
+        </p:style>
+      </p:cxnSp>
+      <p:cxnSp>
+        <p:nvCxnSpPr>
+          <p:cNvPr id="42" name="Straight Arrow Connector 41">
+            <a:extLst>
+              <a:ext uri="{FF2B5EF4-FFF2-40B4-BE49-F238E27FC236}">
+                <a16:creationId xmlns:a16="http://schemas.microsoft.com/office/drawing/2014/main" id="{FDEEDB0E-2FB7-44C0-B44A-8E7035A95B3F}"/>
+              </a:ext>
+            </a:extLst>
+          </p:cNvPr>
+          <p:cNvCxnSpPr/>
+          <p:nvPr/>
+        </p:nvCxnSpPr>
+        <p:spPr>
+          <a:xfrm>
+            <a:off x="8395033" y="3471948"/>
+            <a:ext cx="162246" cy="0"/>
+          </a:xfrm>
+          <a:prstGeom prst="straightConnector1">
+            <a:avLst/>
+          </a:prstGeom>
+          <a:ln w="19050">
+            <a:headEnd type="none" w="med" len="med"/>
+            <a:tailEnd type="arrow" w="med" len="med"/>
           </a:ln>
         </p:spPr>
         <p:style>
@@ -5000,13 +5164,6 @@
   <p:clrMapOvr>
     <a:masterClrMapping/>
   </p:clrMapOvr>
-  <p:timing>
-    <p:tnLst>
-      <p:par>
-        <p:cTn id="1" dur="indefinite" restart="never" nodeType="tmRoot"/>
-      </p:par>
-    </p:tnLst>
-  </p:timing>
 </p:sld>
 </file>
 

</xml_diff>

<commit_message>
Update: pull from main repo (#19)
* Edit PayCommand.java: refactored payment edit 

refactored payment edit with findPaymentToUpdate() and editPaymentField()

* Edit DeveloperGuide.adoc: update sequence diagram after edit payment refactor

* Fix AddCommandParserTest

* Attempt at fixing errors with sequence diagram in developer docs.

* Edit Developer guide implementation

* Modify command style for both earnings and payment

* Fix Payment test

* Fix checkstyle

* Fix checkstyle

* Fix checkstyle

* Refine Group Command to sort based on day or time after filtering the list

* Fix DeveloperGuide.adoc merge conflicts

* Fix DeveloperGuide.adoc merge conflicts

* Fix typos in command files

* Add addsub command

* Fix more typos

* Add deletesub command
</commit_message>
<xml_diff>
--- a/docs/diagrams/GroupSequenceDiagram.pptx
+++ b/docs/diagrams/GroupSequenceDiagram.pptx
@@ -107,6 +107,11 @@
       </a:defRPr>
     </a:lvl9pPr>
   </p:defaultTextStyle>
+  <p:extLst>
+    <p:ext uri="{EFAFB233-063F-42B5-8137-9DF3F51BA10A}">
+      <p15:sldGuideLst xmlns:p15="http://schemas.microsoft.com/office/powerpoint/2012/main"/>
+    </p:ext>
+  </p:extLst>
 </p:presentation>
 </file>
 
@@ -192,7 +197,7 @@
           <a:p>
             <a:fld id="{62511F6D-3957-4073-A6EA-8AA084D57D2E}" type="datetimeFigureOut">
               <a:rPr lang="en-US" smtClean="0"/>
-              <a:t>10/13/2018</a:t>
+              <a:t>10/20/2018</a:t>
             </a:fld>
             <a:endParaRPr lang="en-US"/>
           </a:p>
@@ -256,38 +261,37 @@
           <a:p>
             <a:pPr lvl="0"/>
             <a:r>
-              <a:rPr lang="en-US" smtClean="0"/>
+              <a:rPr lang="en-US"/>
               <a:t>Click to edit Master text styles</a:t>
             </a:r>
           </a:p>
           <a:p>
             <a:pPr lvl="1"/>
             <a:r>
-              <a:rPr lang="en-US" smtClean="0"/>
+              <a:rPr lang="en-US"/>
               <a:t>Second level</a:t>
             </a:r>
           </a:p>
           <a:p>
             <a:pPr lvl="2"/>
             <a:r>
-              <a:rPr lang="en-US" smtClean="0"/>
+              <a:rPr lang="en-US"/>
               <a:t>Third level</a:t>
             </a:r>
           </a:p>
           <a:p>
             <a:pPr lvl="3"/>
             <a:r>
-              <a:rPr lang="en-US" smtClean="0"/>
+              <a:rPr lang="en-US"/>
               <a:t>Fourth level</a:t>
             </a:r>
           </a:p>
           <a:p>
             <a:pPr lvl="4"/>
             <a:r>
-              <a:rPr lang="en-US" smtClean="0"/>
+              <a:rPr lang="en-US"/>
               <a:t>Fifth level</a:t>
             </a:r>
-            <a:endParaRPr lang="en-US"/>
           </a:p>
         </p:txBody>
       </p:sp>
@@ -505,12 +509,8 @@
           <a:lstStyle/>
           <a:p>
             <a:r>
-              <a:rPr lang="en-SG" dirty="0" smtClean="0"/>
-              <a:t>Group Sequence </a:t>
-            </a:r>
-            <a:r>
-              <a:rPr lang="en-SG" dirty="0" smtClean="0"/>
-              <a:t>Diagram</a:t>
+              <a:rPr lang="en-SG" dirty="0"/>
+              <a:t>Group Sequence Diagram</a:t>
             </a:r>
             <a:endParaRPr lang="en-US" dirty="0"/>
           </a:p>
@@ -594,10 +594,9 @@
           </a:lstStyle>
           <a:p>
             <a:r>
-              <a:rPr lang="en-US" smtClean="0"/>
+              <a:rPr lang="en-US"/>
               <a:t>Click to edit Master title style</a:t>
             </a:r>
-            <a:endParaRPr lang="en-US"/>
           </a:p>
         </p:txBody>
       </p:sp>
@@ -659,10 +658,9 @@
           </a:lstStyle>
           <a:p>
             <a:r>
-              <a:rPr lang="en-US" smtClean="0"/>
+              <a:rPr lang="en-US"/>
               <a:t>Click to edit Master subtitle style</a:t>
             </a:r>
-            <a:endParaRPr lang="en-US"/>
           </a:p>
         </p:txBody>
       </p:sp>
@@ -683,7 +681,7 @@
           <a:p>
             <a:fld id="{56380CDC-2C67-42AA-B1DF-B7373BF777ED}" type="datetimeFigureOut">
               <a:rPr lang="en-US" smtClean="0"/>
-              <a:t>10/13/2018</a:t>
+              <a:t>10/20/2018</a:t>
             </a:fld>
             <a:endParaRPr lang="en-US"/>
           </a:p>
@@ -777,10 +775,9 @@
           <a:lstStyle/>
           <a:p>
             <a:r>
-              <a:rPr lang="en-US" smtClean="0"/>
+              <a:rPr lang="en-US"/>
               <a:t>Click to edit Master title style</a:t>
             </a:r>
-            <a:endParaRPr lang="en-US"/>
           </a:p>
         </p:txBody>
       </p:sp>
@@ -801,38 +798,37 @@
           <a:p>
             <a:pPr lvl="0"/>
             <a:r>
-              <a:rPr lang="en-US" smtClean="0"/>
+              <a:rPr lang="en-US"/>
               <a:t>Click to edit Master text styles</a:t>
             </a:r>
           </a:p>
           <a:p>
             <a:pPr lvl="1"/>
             <a:r>
-              <a:rPr lang="en-US" smtClean="0"/>
+              <a:rPr lang="en-US"/>
               <a:t>Second level</a:t>
             </a:r>
           </a:p>
           <a:p>
             <a:pPr lvl="2"/>
             <a:r>
-              <a:rPr lang="en-US" smtClean="0"/>
+              <a:rPr lang="en-US"/>
               <a:t>Third level</a:t>
             </a:r>
           </a:p>
           <a:p>
             <a:pPr lvl="3"/>
             <a:r>
-              <a:rPr lang="en-US" smtClean="0"/>
+              <a:rPr lang="en-US"/>
               <a:t>Fourth level</a:t>
             </a:r>
           </a:p>
           <a:p>
             <a:pPr lvl="4"/>
             <a:r>
-              <a:rPr lang="en-US" smtClean="0"/>
+              <a:rPr lang="en-US"/>
               <a:t>Fifth level</a:t>
             </a:r>
-            <a:endParaRPr lang="en-US"/>
           </a:p>
         </p:txBody>
       </p:sp>
@@ -853,7 +849,7 @@
           <a:p>
             <a:fld id="{56380CDC-2C67-42AA-B1DF-B7373BF777ED}" type="datetimeFigureOut">
               <a:rPr lang="en-US" smtClean="0"/>
-              <a:t>10/13/2018</a:t>
+              <a:t>10/20/2018</a:t>
             </a:fld>
             <a:endParaRPr lang="en-US"/>
           </a:p>
@@ -952,10 +948,9 @@
           <a:lstStyle/>
           <a:p>
             <a:r>
-              <a:rPr lang="en-US" smtClean="0"/>
+              <a:rPr lang="en-US"/>
               <a:t>Click to edit Master title style</a:t>
             </a:r>
-            <a:endParaRPr lang="en-US"/>
           </a:p>
         </p:txBody>
       </p:sp>
@@ -981,38 +976,37 @@
           <a:p>
             <a:pPr lvl="0"/>
             <a:r>
-              <a:rPr lang="en-US" smtClean="0"/>
+              <a:rPr lang="en-US"/>
               <a:t>Click to edit Master text styles</a:t>
             </a:r>
           </a:p>
           <a:p>
             <a:pPr lvl="1"/>
             <a:r>
-              <a:rPr lang="en-US" smtClean="0"/>
+              <a:rPr lang="en-US"/>
               <a:t>Second level</a:t>
             </a:r>
           </a:p>
           <a:p>
             <a:pPr lvl="2"/>
             <a:r>
-              <a:rPr lang="en-US" smtClean="0"/>
+              <a:rPr lang="en-US"/>
               <a:t>Third level</a:t>
             </a:r>
           </a:p>
           <a:p>
             <a:pPr lvl="3"/>
             <a:r>
-              <a:rPr lang="en-US" smtClean="0"/>
+              <a:rPr lang="en-US"/>
               <a:t>Fourth level</a:t>
             </a:r>
           </a:p>
           <a:p>
             <a:pPr lvl="4"/>
             <a:r>
-              <a:rPr lang="en-US" smtClean="0"/>
+              <a:rPr lang="en-US"/>
               <a:t>Fifth level</a:t>
             </a:r>
-            <a:endParaRPr lang="en-US"/>
           </a:p>
         </p:txBody>
       </p:sp>
@@ -1033,7 +1027,7 @@
           <a:p>
             <a:fld id="{56380CDC-2C67-42AA-B1DF-B7373BF777ED}" type="datetimeFigureOut">
               <a:rPr lang="en-US" smtClean="0"/>
-              <a:t>10/13/2018</a:t>
+              <a:t>10/20/2018</a:t>
             </a:fld>
             <a:endParaRPr lang="en-US"/>
           </a:p>
@@ -1127,10 +1121,9 @@
           <a:lstStyle/>
           <a:p>
             <a:r>
-              <a:rPr lang="en-US" smtClean="0"/>
+              <a:rPr lang="en-US"/>
               <a:t>Click to edit Master title style</a:t>
             </a:r>
-            <a:endParaRPr lang="en-US"/>
           </a:p>
         </p:txBody>
       </p:sp>
@@ -1151,38 +1144,37 @@
           <a:p>
             <a:pPr lvl="0"/>
             <a:r>
-              <a:rPr lang="en-US" smtClean="0"/>
+              <a:rPr lang="en-US"/>
               <a:t>Click to edit Master text styles</a:t>
             </a:r>
           </a:p>
           <a:p>
             <a:pPr lvl="1"/>
             <a:r>
-              <a:rPr lang="en-US" smtClean="0"/>
+              <a:rPr lang="en-US"/>
               <a:t>Second level</a:t>
             </a:r>
           </a:p>
           <a:p>
             <a:pPr lvl="2"/>
             <a:r>
-              <a:rPr lang="en-US" smtClean="0"/>
+              <a:rPr lang="en-US"/>
               <a:t>Third level</a:t>
             </a:r>
           </a:p>
           <a:p>
             <a:pPr lvl="3"/>
             <a:r>
-              <a:rPr lang="en-US" smtClean="0"/>
+              <a:rPr lang="en-US"/>
               <a:t>Fourth level</a:t>
             </a:r>
           </a:p>
           <a:p>
             <a:pPr lvl="4"/>
             <a:r>
-              <a:rPr lang="en-US" smtClean="0"/>
+              <a:rPr lang="en-US"/>
               <a:t>Fifth level</a:t>
             </a:r>
-            <a:endParaRPr lang="en-US"/>
           </a:p>
         </p:txBody>
       </p:sp>
@@ -1203,7 +1195,7 @@
           <a:p>
             <a:fld id="{56380CDC-2C67-42AA-B1DF-B7373BF777ED}" type="datetimeFigureOut">
               <a:rPr lang="en-US" smtClean="0"/>
-              <a:t>10/13/2018</a:t>
+              <a:t>10/20/2018</a:t>
             </a:fld>
             <a:endParaRPr lang="en-US"/>
           </a:p>
@@ -1306,10 +1298,9 @@
           </a:lstStyle>
           <a:p>
             <a:r>
-              <a:rPr lang="en-US" smtClean="0"/>
+              <a:rPr lang="en-US"/>
               <a:t>Click to edit Master title style</a:t>
             </a:r>
-            <a:endParaRPr lang="en-US"/>
           </a:p>
         </p:txBody>
       </p:sp>
@@ -1426,7 +1417,7 @@
           <a:p>
             <a:pPr lvl="0"/>
             <a:r>
-              <a:rPr lang="en-US" smtClean="0"/>
+              <a:rPr lang="en-US"/>
               <a:t>Click to edit Master text styles</a:t>
             </a:r>
           </a:p>
@@ -1449,7 +1440,7 @@
           <a:p>
             <a:fld id="{56380CDC-2C67-42AA-B1DF-B7373BF777ED}" type="datetimeFigureOut">
               <a:rPr lang="en-US" smtClean="0"/>
-              <a:t>10/13/2018</a:t>
+              <a:t>10/20/2018</a:t>
             </a:fld>
             <a:endParaRPr lang="en-US"/>
           </a:p>
@@ -1543,10 +1534,9 @@
           <a:lstStyle/>
           <a:p>
             <a:r>
-              <a:rPr lang="en-US" smtClean="0"/>
+              <a:rPr lang="en-US"/>
               <a:t>Click to edit Master title style</a:t>
             </a:r>
-            <a:endParaRPr lang="en-US"/>
           </a:p>
         </p:txBody>
       </p:sp>
@@ -1572,38 +1562,37 @@
           <a:p>
             <a:pPr lvl="0"/>
             <a:r>
-              <a:rPr lang="en-US" smtClean="0"/>
+              <a:rPr lang="en-US"/>
               <a:t>Click to edit Master text styles</a:t>
             </a:r>
           </a:p>
           <a:p>
             <a:pPr lvl="1"/>
             <a:r>
-              <a:rPr lang="en-US" smtClean="0"/>
+              <a:rPr lang="en-US"/>
               <a:t>Second level</a:t>
             </a:r>
           </a:p>
           <a:p>
             <a:pPr lvl="2"/>
             <a:r>
-              <a:rPr lang="en-US" smtClean="0"/>
+              <a:rPr lang="en-US"/>
               <a:t>Third level</a:t>
             </a:r>
           </a:p>
           <a:p>
             <a:pPr lvl="3"/>
             <a:r>
-              <a:rPr lang="en-US" smtClean="0"/>
+              <a:rPr lang="en-US"/>
               <a:t>Fourth level</a:t>
             </a:r>
           </a:p>
           <a:p>
             <a:pPr lvl="4"/>
             <a:r>
-              <a:rPr lang="en-US" smtClean="0"/>
+              <a:rPr lang="en-US"/>
               <a:t>Fifth level</a:t>
             </a:r>
-            <a:endParaRPr lang="en-US"/>
           </a:p>
         </p:txBody>
       </p:sp>
@@ -1629,38 +1618,37 @@
           <a:p>
             <a:pPr lvl="0"/>
             <a:r>
-              <a:rPr lang="en-US" smtClean="0"/>
+              <a:rPr lang="en-US"/>
               <a:t>Click to edit Master text styles</a:t>
             </a:r>
           </a:p>
           <a:p>
             <a:pPr lvl="1"/>
             <a:r>
-              <a:rPr lang="en-US" smtClean="0"/>
+              <a:rPr lang="en-US"/>
               <a:t>Second level</a:t>
             </a:r>
           </a:p>
           <a:p>
             <a:pPr lvl="2"/>
             <a:r>
-              <a:rPr lang="en-US" smtClean="0"/>
+              <a:rPr lang="en-US"/>
               <a:t>Third level</a:t>
             </a:r>
           </a:p>
           <a:p>
             <a:pPr lvl="3"/>
             <a:r>
-              <a:rPr lang="en-US" smtClean="0"/>
+              <a:rPr lang="en-US"/>
               <a:t>Fourth level</a:t>
             </a:r>
           </a:p>
           <a:p>
             <a:pPr lvl="4"/>
             <a:r>
-              <a:rPr lang="en-US" smtClean="0"/>
+              <a:rPr lang="en-US"/>
               <a:t>Fifth level</a:t>
             </a:r>
-            <a:endParaRPr lang="en-US"/>
           </a:p>
         </p:txBody>
       </p:sp>
@@ -1681,7 +1669,7 @@
           <a:p>
             <a:fld id="{56380CDC-2C67-42AA-B1DF-B7373BF777ED}" type="datetimeFigureOut">
               <a:rPr lang="en-US" smtClean="0"/>
-              <a:t>10/13/2018</a:t>
+              <a:t>10/20/2018</a:t>
             </a:fld>
             <a:endParaRPr lang="en-US"/>
           </a:p>
@@ -1780,10 +1768,9 @@
           <a:lstStyle/>
           <a:p>
             <a:r>
-              <a:rPr lang="en-US" smtClean="0"/>
+              <a:rPr lang="en-US"/>
               <a:t>Click to edit Master title style</a:t>
             </a:r>
-            <a:endParaRPr lang="en-US"/>
           </a:p>
         </p:txBody>
       </p:sp>
@@ -1846,7 +1833,7 @@
           <a:p>
             <a:pPr lvl="0"/>
             <a:r>
-              <a:rPr lang="en-US" smtClean="0"/>
+              <a:rPr lang="en-US"/>
               <a:t>Click to edit Master text styles</a:t>
             </a:r>
           </a:p>
@@ -1874,38 +1861,37 @@
           <a:p>
             <a:pPr lvl="0"/>
             <a:r>
-              <a:rPr lang="en-US" smtClean="0"/>
+              <a:rPr lang="en-US"/>
               <a:t>Click to edit Master text styles</a:t>
             </a:r>
           </a:p>
           <a:p>
             <a:pPr lvl="1"/>
             <a:r>
-              <a:rPr lang="en-US" smtClean="0"/>
+              <a:rPr lang="en-US"/>
               <a:t>Second level</a:t>
             </a:r>
           </a:p>
           <a:p>
             <a:pPr lvl="2"/>
             <a:r>
-              <a:rPr lang="en-US" smtClean="0"/>
+              <a:rPr lang="en-US"/>
               <a:t>Third level</a:t>
             </a:r>
           </a:p>
           <a:p>
             <a:pPr lvl="3"/>
             <a:r>
-              <a:rPr lang="en-US" smtClean="0"/>
+              <a:rPr lang="en-US"/>
               <a:t>Fourth level</a:t>
             </a:r>
           </a:p>
           <a:p>
             <a:pPr lvl="4"/>
             <a:r>
-              <a:rPr lang="en-US" smtClean="0"/>
+              <a:rPr lang="en-US"/>
               <a:t>Fifth level</a:t>
             </a:r>
-            <a:endParaRPr lang="en-US"/>
           </a:p>
         </p:txBody>
       </p:sp>
@@ -1968,7 +1954,7 @@
           <a:p>
             <a:pPr lvl="0"/>
             <a:r>
-              <a:rPr lang="en-US" smtClean="0"/>
+              <a:rPr lang="en-US"/>
               <a:t>Click to edit Master text styles</a:t>
             </a:r>
           </a:p>
@@ -1996,38 +1982,37 @@
           <a:p>
             <a:pPr lvl="0"/>
             <a:r>
-              <a:rPr lang="en-US" smtClean="0"/>
+              <a:rPr lang="en-US"/>
               <a:t>Click to edit Master text styles</a:t>
             </a:r>
           </a:p>
           <a:p>
             <a:pPr lvl="1"/>
             <a:r>
-              <a:rPr lang="en-US" smtClean="0"/>
+              <a:rPr lang="en-US"/>
               <a:t>Second level</a:t>
             </a:r>
           </a:p>
           <a:p>
             <a:pPr lvl="2"/>
             <a:r>
-              <a:rPr lang="en-US" smtClean="0"/>
+              <a:rPr lang="en-US"/>
               <a:t>Third level</a:t>
             </a:r>
           </a:p>
           <a:p>
             <a:pPr lvl="3"/>
             <a:r>
-              <a:rPr lang="en-US" smtClean="0"/>
+              <a:rPr lang="en-US"/>
               <a:t>Fourth level</a:t>
             </a:r>
           </a:p>
           <a:p>
             <a:pPr lvl="4"/>
             <a:r>
-              <a:rPr lang="en-US" smtClean="0"/>
+              <a:rPr lang="en-US"/>
               <a:t>Fifth level</a:t>
             </a:r>
-            <a:endParaRPr lang="en-US"/>
           </a:p>
         </p:txBody>
       </p:sp>
@@ -2048,7 +2033,7 @@
           <a:p>
             <a:fld id="{56380CDC-2C67-42AA-B1DF-B7373BF777ED}" type="datetimeFigureOut">
               <a:rPr lang="en-US" smtClean="0"/>
-              <a:t>10/13/2018</a:t>
+              <a:t>10/20/2018</a:t>
             </a:fld>
             <a:endParaRPr lang="en-US"/>
           </a:p>
@@ -2142,10 +2127,9 @@
           <a:lstStyle/>
           <a:p>
             <a:r>
-              <a:rPr lang="en-US" smtClean="0"/>
+              <a:rPr lang="en-US"/>
               <a:t>Click to edit Master title style</a:t>
             </a:r>
-            <a:endParaRPr lang="en-US"/>
           </a:p>
         </p:txBody>
       </p:sp>
@@ -2166,7 +2150,7 @@
           <a:p>
             <a:fld id="{56380CDC-2C67-42AA-B1DF-B7373BF777ED}" type="datetimeFigureOut">
               <a:rPr lang="en-US" smtClean="0"/>
-              <a:t>10/13/2018</a:t>
+              <a:t>10/20/2018</a:t>
             </a:fld>
             <a:endParaRPr lang="en-US"/>
           </a:p>
@@ -2261,7 +2245,7 @@
           <a:p>
             <a:fld id="{56380CDC-2C67-42AA-B1DF-B7373BF777ED}" type="datetimeFigureOut">
               <a:rPr lang="en-US" smtClean="0"/>
-              <a:t>10/13/2018</a:t>
+              <a:t>10/20/2018</a:t>
             </a:fld>
             <a:endParaRPr lang="en-US"/>
           </a:p>
@@ -2364,10 +2348,9 @@
           </a:lstStyle>
           <a:p>
             <a:r>
-              <a:rPr lang="en-US" smtClean="0"/>
+              <a:rPr lang="en-US"/>
               <a:t>Click to edit Master title style</a:t>
             </a:r>
-            <a:endParaRPr lang="en-US"/>
           </a:p>
         </p:txBody>
       </p:sp>
@@ -2421,38 +2404,37 @@
           <a:p>
             <a:pPr lvl="0"/>
             <a:r>
-              <a:rPr lang="en-US" smtClean="0"/>
+              <a:rPr lang="en-US"/>
               <a:t>Click to edit Master text styles</a:t>
             </a:r>
           </a:p>
           <a:p>
             <a:pPr lvl="1"/>
             <a:r>
-              <a:rPr lang="en-US" smtClean="0"/>
+              <a:rPr lang="en-US"/>
               <a:t>Second level</a:t>
             </a:r>
           </a:p>
           <a:p>
             <a:pPr lvl="2"/>
             <a:r>
-              <a:rPr lang="en-US" smtClean="0"/>
+              <a:rPr lang="en-US"/>
               <a:t>Third level</a:t>
             </a:r>
           </a:p>
           <a:p>
             <a:pPr lvl="3"/>
             <a:r>
-              <a:rPr lang="en-US" smtClean="0"/>
+              <a:rPr lang="en-US"/>
               <a:t>Fourth level</a:t>
             </a:r>
           </a:p>
           <a:p>
             <a:pPr lvl="4"/>
             <a:r>
-              <a:rPr lang="en-US" smtClean="0"/>
+              <a:rPr lang="en-US"/>
               <a:t>Fifth level</a:t>
             </a:r>
-            <a:endParaRPr lang="en-US"/>
           </a:p>
         </p:txBody>
       </p:sp>
@@ -2515,7 +2497,7 @@
           <a:p>
             <a:pPr lvl="0"/>
             <a:r>
-              <a:rPr lang="en-US" smtClean="0"/>
+              <a:rPr lang="en-US"/>
               <a:t>Click to edit Master text styles</a:t>
             </a:r>
           </a:p>
@@ -2538,7 +2520,7 @@
           <a:p>
             <a:fld id="{56380CDC-2C67-42AA-B1DF-B7373BF777ED}" type="datetimeFigureOut">
               <a:rPr lang="en-US" smtClean="0"/>
-              <a:t>10/13/2018</a:t>
+              <a:t>10/20/2018</a:t>
             </a:fld>
             <a:endParaRPr lang="en-US"/>
           </a:p>
@@ -2641,10 +2623,9 @@
           </a:lstStyle>
           <a:p>
             <a:r>
-              <a:rPr lang="en-US" smtClean="0"/>
+              <a:rPr lang="en-US"/>
               <a:t>Click to edit Master title style</a:t>
             </a:r>
-            <a:endParaRPr lang="en-US"/>
           </a:p>
         </p:txBody>
       </p:sp>
@@ -2768,7 +2749,7 @@
           <a:p>
             <a:pPr lvl="0"/>
             <a:r>
-              <a:rPr lang="en-US" smtClean="0"/>
+              <a:rPr lang="en-US"/>
               <a:t>Click to edit Master text styles</a:t>
             </a:r>
           </a:p>
@@ -2791,7 +2772,7 @@
           <a:p>
             <a:fld id="{56380CDC-2C67-42AA-B1DF-B7373BF777ED}" type="datetimeFigureOut">
               <a:rPr lang="en-US" smtClean="0"/>
-              <a:t>10/13/2018</a:t>
+              <a:t>10/20/2018</a:t>
             </a:fld>
             <a:endParaRPr lang="en-US"/>
           </a:p>
@@ -2900,10 +2881,9 @@
           <a:lstStyle/>
           <a:p>
             <a:r>
-              <a:rPr lang="en-US" smtClean="0"/>
+              <a:rPr lang="en-US"/>
               <a:t>Click to edit Master title style</a:t>
             </a:r>
-            <a:endParaRPr lang="en-US"/>
           </a:p>
         </p:txBody>
       </p:sp>
@@ -2934,38 +2914,37 @@
           <a:p>
             <a:pPr lvl="0"/>
             <a:r>
-              <a:rPr lang="en-US" smtClean="0"/>
+              <a:rPr lang="en-US"/>
               <a:t>Click to edit Master text styles</a:t>
             </a:r>
           </a:p>
           <a:p>
             <a:pPr lvl="1"/>
             <a:r>
-              <a:rPr lang="en-US" smtClean="0"/>
+              <a:rPr lang="en-US"/>
               <a:t>Second level</a:t>
             </a:r>
           </a:p>
           <a:p>
             <a:pPr lvl="2"/>
             <a:r>
-              <a:rPr lang="en-US" smtClean="0"/>
+              <a:rPr lang="en-US"/>
               <a:t>Third level</a:t>
             </a:r>
           </a:p>
           <a:p>
             <a:pPr lvl="3"/>
             <a:r>
-              <a:rPr lang="en-US" smtClean="0"/>
+              <a:rPr lang="en-US"/>
               <a:t>Fourth level</a:t>
             </a:r>
           </a:p>
           <a:p>
             <a:pPr lvl="4"/>
             <a:r>
-              <a:rPr lang="en-US" smtClean="0"/>
+              <a:rPr lang="en-US"/>
               <a:t>Fifth level</a:t>
             </a:r>
-            <a:endParaRPr lang="en-US"/>
           </a:p>
         </p:txBody>
       </p:sp>
@@ -3004,7 +2983,7 @@
           <a:p>
             <a:fld id="{56380CDC-2C67-42AA-B1DF-B7373BF777ED}" type="datetimeFigureOut">
               <a:rPr lang="en-US" smtClean="0"/>
-              <a:t>10/13/2018</a:t>
+              <a:t>10/20/2018</a:t>
             </a:fld>
             <a:endParaRPr lang="en-US"/>
           </a:p>
@@ -3417,7 +3396,7 @@
         </p:nvSpPr>
         <p:spPr>
           <a:xfrm>
-            <a:off x="9272660" y="158637"/>
+            <a:off x="9270131" y="154256"/>
             <a:ext cx="1395341" cy="4347781"/>
           </a:xfrm>
           <a:prstGeom prst="roundRect">
@@ -3887,13 +3866,15 @@
       <p:cxnSp>
         <p:nvCxnSpPr>
           <p:cNvPr id="23" name="Straight Arrow Connector 22"/>
-          <p:cNvCxnSpPr/>
+          <p:cNvCxnSpPr>
+            <a:cxnSpLocks/>
+          </p:cNvCxnSpPr>
           <p:nvPr/>
         </p:nvCxnSpPr>
         <p:spPr>
           <a:xfrm>
-            <a:off x="1943101" y="1261999"/>
-            <a:ext cx="1119851" cy="0"/>
+            <a:off x="1088571" y="1258312"/>
+            <a:ext cx="1974381" cy="3687"/>
           </a:xfrm>
           <a:prstGeom prst="straightConnector1">
             <a:avLst/>
@@ -3948,15 +3929,7 @@
                   <a:srgbClr val="0070C0"/>
                 </a:solidFill>
               </a:rPr>
-              <a:t>execute</a:t>
-            </a:r>
-            <a:r>
-              <a:rPr lang="en-US" sz="1100" dirty="0">
-                <a:solidFill>
-                  <a:srgbClr val="0070C0"/>
-                </a:solidFill>
-              </a:rPr>
-              <a:t>(</a:t>
+              <a:t>execute(</a:t>
             </a:r>
           </a:p>
           <a:p>
@@ -3968,11 +3941,6 @@
               </a:rPr>
               <a:t>“group Monday”)</a:t>
             </a:r>
-            <a:endParaRPr lang="en-US" sz="1100" dirty="0">
-              <a:solidFill>
-                <a:srgbClr val="0070C0"/>
-              </a:solidFill>
-            </a:endParaRPr>
           </a:p>
         </p:txBody>
       </p:sp>
@@ -4217,11 +4185,6 @@
               </a:rPr>
               <a:t>()</a:t>
             </a:r>
-            <a:endParaRPr lang="en-US" sz="1000" dirty="0">
-              <a:solidFill>
-                <a:srgbClr val="7030A0"/>
-              </a:solidFill>
-            </a:endParaRPr>
           </a:p>
         </p:txBody>
       </p:sp>
@@ -4266,7 +4229,6 @@
               <a:rPr lang="en-US" sz="1100" dirty="0"/>
               <a:t>(“group Monday”)</a:t>
             </a:r>
-            <a:endParaRPr lang="en-US" sz="1100" dirty="0"/>
           </a:p>
         </p:txBody>
       </p:sp>
@@ -4358,7 +4320,7 @@
         </p:nvSpPr>
         <p:spPr>
           <a:xfrm>
-            <a:off x="9506904" y="2362200"/>
+            <a:off x="9492858" y="713883"/>
             <a:ext cx="841636" cy="300180"/>
           </a:xfrm>
           <a:prstGeom prst="rect">
@@ -4418,9 +4380,9 @@
           <p:nvPr/>
         </p:nvCxnSpPr>
         <p:spPr>
-          <a:xfrm flipH="1">
-            <a:off x="9943631" y="2653306"/>
-            <a:ext cx="3959" cy="1735710"/>
+          <a:xfrm>
+            <a:off x="9940468" y="1056121"/>
+            <a:ext cx="3164" cy="3332895"/>
           </a:xfrm>
           <a:prstGeom prst="line">
             <a:avLst/>
@@ -4456,8 +4418,8 @@
         </p:nvSpPr>
         <p:spPr>
           <a:xfrm>
-            <a:off x="9844666" y="2958107"/>
-            <a:ext cx="168896" cy="775693"/>
+            <a:off x="9844666" y="2958108"/>
+            <a:ext cx="183432" cy="135612"/>
           </a:xfrm>
           <a:prstGeom prst="rect">
             <a:avLst/>
@@ -4584,14 +4546,6 @@
               </a:rPr>
               <a:t>:Group</a:t>
             </a:r>
-            <a:r>
-              <a:rPr lang="en-US" sz="1050" dirty="0">
-                <a:solidFill>
-                  <a:schemeClr val="bg1"/>
-                </a:solidFill>
-              </a:rPr>
-              <a:t/>
-            </a:r>
             <a:br>
               <a:rPr lang="en-US" sz="1050" dirty="0">
                 <a:solidFill>
@@ -4620,7 +4574,7 @@
           <p:cNvPr id="66" name="Straight Arrow Connector 65">
             <a:extLst>
               <a:ext uri="{FF2B5EF4-FFF2-40B4-BE49-F238E27FC236}">
-                <a16:creationId xmlns="" xmlns:a16="http://schemas.microsoft.com/office/drawing/2014/main" id="{39916E2E-195A-4DC8-B025-B05FA87E6796}"/>
+                <a16:creationId xmlns:a16="http://schemas.microsoft.com/office/drawing/2014/main" id="{39916E2E-195A-4DC8-B025-B05FA87E6796}"/>
               </a:ext>
             </a:extLst>
           </p:cNvPr>
@@ -4664,7 +4618,7 @@
           <p:cNvPr id="67" name="Straight Arrow Connector 66">
             <a:extLst>
               <a:ext uri="{FF2B5EF4-FFF2-40B4-BE49-F238E27FC236}">
-                <a16:creationId xmlns="" xmlns:a16="http://schemas.microsoft.com/office/drawing/2014/main" id="{D881596E-177C-4FDC-8E60-CAB90B3D5FAB}"/>
+                <a16:creationId xmlns:a16="http://schemas.microsoft.com/office/drawing/2014/main" id="{D881596E-177C-4FDC-8E60-CAB90B3D5FAB}"/>
               </a:ext>
             </a:extLst>
           </p:cNvPr>
@@ -4708,7 +4662,7 @@
           <p:cNvPr id="69" name="Straight Arrow Connector 68">
             <a:extLst>
               <a:ext uri="{FF2B5EF4-FFF2-40B4-BE49-F238E27FC236}">
-                <a16:creationId xmlns="" xmlns:a16="http://schemas.microsoft.com/office/drawing/2014/main" id="{7C9F21BC-13A9-471F-825A-2621FD36355F}"/>
+                <a16:creationId xmlns:a16="http://schemas.microsoft.com/office/drawing/2014/main" id="{7C9F21BC-13A9-471F-825A-2621FD36355F}"/>
               </a:ext>
             </a:extLst>
           </p:cNvPr>
@@ -4754,7 +4708,7 @@
           <p:cNvPr id="63" name="Straight Arrow Connector 62">
             <a:extLst>
               <a:ext uri="{FF2B5EF4-FFF2-40B4-BE49-F238E27FC236}">
-                <a16:creationId xmlns="" xmlns:a16="http://schemas.microsoft.com/office/drawing/2014/main" id="{7C9F21BC-13A9-471F-825A-2621FD36355F}"/>
+                <a16:creationId xmlns:a16="http://schemas.microsoft.com/office/drawing/2014/main" id="{7C9F21BC-13A9-471F-825A-2621FD36355F}"/>
               </a:ext>
             </a:extLst>
           </p:cNvPr>
@@ -4765,7 +4719,7 @@
         </p:nvCxnSpPr>
         <p:spPr>
           <a:xfrm>
-            <a:off x="8411868" y="3733799"/>
+            <a:off x="8411868" y="3093720"/>
             <a:ext cx="1432799" cy="0"/>
           </a:xfrm>
           <a:prstGeom prst="straightConnector1">
@@ -4973,6 +4927,216 @@
             <a:prstDash val="sysDash"/>
             <a:headEnd type="arrow" w="med" len="med"/>
             <a:tailEnd type="none" w="med" len="med"/>
+          </a:ln>
+        </p:spPr>
+        <p:style>
+          <a:lnRef idx="1">
+            <a:schemeClr val="accent1"/>
+          </a:lnRef>
+          <a:fillRef idx="0">
+            <a:schemeClr val="accent1"/>
+          </a:fillRef>
+          <a:effectRef idx="0">
+            <a:schemeClr val="accent1"/>
+          </a:effectRef>
+          <a:fontRef idx="minor">
+            <a:schemeClr val="tx1"/>
+          </a:fontRef>
+        </p:style>
+      </p:cxnSp>
+      <p:sp>
+        <p:nvSpPr>
+          <p:cNvPr id="38" name="Rectangle 62">
+            <a:extLst>
+              <a:ext uri="{FF2B5EF4-FFF2-40B4-BE49-F238E27FC236}">
+                <a16:creationId xmlns:a16="http://schemas.microsoft.com/office/drawing/2014/main" id="{B8802F0A-4D78-47F0-8DFB-89576A4731C3}"/>
+              </a:ext>
+            </a:extLst>
+          </p:cNvPr>
+          <p:cNvSpPr/>
+          <p:nvPr/>
+        </p:nvSpPr>
+        <p:spPr>
+          <a:xfrm>
+            <a:off x="8557280" y="3220034"/>
+            <a:ext cx="1275707" cy="461538"/>
+          </a:xfrm>
+          <a:prstGeom prst="rect">
+            <a:avLst/>
+          </a:prstGeom>
+          <a:solidFill>
+            <a:srgbClr val="0070C0"/>
+          </a:solidFill>
+          <a:ln w="19050">
+            <a:solidFill>
+              <a:srgbClr val="0070C0"/>
+            </a:solidFill>
+          </a:ln>
+          <a:effectLst/>
+        </p:spPr>
+        <p:style>
+          <a:lnRef idx="1">
+            <a:schemeClr val="accent2"/>
+          </a:lnRef>
+          <a:fillRef idx="2">
+            <a:schemeClr val="accent2"/>
+          </a:fillRef>
+          <a:effectRef idx="1">
+            <a:schemeClr val="accent2"/>
+          </a:effectRef>
+          <a:fontRef idx="minor">
+            <a:schemeClr val="dk1"/>
+          </a:fontRef>
+        </p:style>
+        <p:txBody>
+          <a:bodyPr rtlCol="0" anchor="ctr"/>
+          <a:lstStyle/>
+          <a:p>
+            <a:pPr algn="ctr"/>
+            <a:r>
+              <a:rPr lang="en-US" sz="1200" dirty="0" err="1">
+                <a:solidFill>
+                  <a:schemeClr val="bg1"/>
+                </a:solidFill>
+              </a:rPr>
+              <a:t>result:Command</a:t>
+            </a:r>
+            <a:r>
+              <a:rPr lang="en-US" sz="1200" dirty="0">
+                <a:solidFill>
+                  <a:schemeClr val="bg1"/>
+                </a:solidFill>
+              </a:rPr>
+              <a:t> Result</a:t>
+            </a:r>
+            <a:endParaRPr lang="en-SG" sz="1200" dirty="0">
+              <a:solidFill>
+                <a:schemeClr val="bg1"/>
+              </a:solidFill>
+            </a:endParaRPr>
+          </a:p>
+        </p:txBody>
+      </p:sp>
+      <p:sp>
+        <p:nvSpPr>
+          <p:cNvPr id="39" name="Rectangle 38">
+            <a:extLst>
+              <a:ext uri="{FF2B5EF4-FFF2-40B4-BE49-F238E27FC236}">
+                <a16:creationId xmlns:a16="http://schemas.microsoft.com/office/drawing/2014/main" id="{8E4BE5F9-EB9B-4D28-A1DC-AB55BF8245AE}"/>
+              </a:ext>
+            </a:extLst>
+          </p:cNvPr>
+          <p:cNvSpPr/>
+          <p:nvPr/>
+        </p:nvSpPr>
+        <p:spPr>
+          <a:xfrm>
+            <a:off x="9123781" y="3681572"/>
+            <a:ext cx="152400" cy="171376"/>
+          </a:xfrm>
+          <a:prstGeom prst="rect">
+            <a:avLst/>
+          </a:prstGeom>
+          <a:solidFill>
+            <a:srgbClr val="0070C0"/>
+          </a:solidFill>
+          <a:ln>
+            <a:solidFill>
+              <a:srgbClr val="0070C0"/>
+            </a:solidFill>
+          </a:ln>
+          <a:effectLst/>
+        </p:spPr>
+        <p:style>
+          <a:lnRef idx="1">
+            <a:schemeClr val="accent3"/>
+          </a:lnRef>
+          <a:fillRef idx="2">
+            <a:schemeClr val="accent3"/>
+          </a:fillRef>
+          <a:effectRef idx="1">
+            <a:schemeClr val="accent3"/>
+          </a:effectRef>
+          <a:fontRef idx="minor">
+            <a:schemeClr val="dk1"/>
+          </a:fontRef>
+        </p:style>
+        <p:txBody>
+          <a:bodyPr rtlCol="0" anchor="ctr"/>
+          <a:lstStyle/>
+          <a:p>
+            <a:pPr algn="ctr"/>
+            <a:endParaRPr lang="en-SG" sz="1400"/>
+          </a:p>
+        </p:txBody>
+      </p:sp>
+      <p:cxnSp>
+        <p:nvCxnSpPr>
+          <p:cNvPr id="41" name="Straight Arrow Connector 40">
+            <a:extLst>
+              <a:ext uri="{FF2B5EF4-FFF2-40B4-BE49-F238E27FC236}">
+                <a16:creationId xmlns:a16="http://schemas.microsoft.com/office/drawing/2014/main" id="{D9B939C0-01B7-4875-BD2B-2E3D2CD16665}"/>
+              </a:ext>
+            </a:extLst>
+          </p:cNvPr>
+          <p:cNvCxnSpPr/>
+          <p:nvPr/>
+        </p:nvCxnSpPr>
+        <p:spPr>
+          <a:xfrm>
+            <a:off x="8361781" y="3852948"/>
+            <a:ext cx="762000" cy="0"/>
+          </a:xfrm>
+          <a:prstGeom prst="straightConnector1">
+            <a:avLst/>
+          </a:prstGeom>
+          <a:ln w="19050">
+            <a:solidFill>
+              <a:srgbClr val="0070C0"/>
+            </a:solidFill>
+            <a:prstDash val="sysDash"/>
+            <a:headEnd type="arrow" w="med" len="med"/>
+            <a:tailEnd type="none" w="med" len="med"/>
+          </a:ln>
+        </p:spPr>
+        <p:style>
+          <a:lnRef idx="1">
+            <a:schemeClr val="accent1"/>
+          </a:lnRef>
+          <a:fillRef idx="0">
+            <a:schemeClr val="accent1"/>
+          </a:fillRef>
+          <a:effectRef idx="0">
+            <a:schemeClr val="accent1"/>
+          </a:effectRef>
+          <a:fontRef idx="minor">
+            <a:schemeClr val="tx1"/>
+          </a:fontRef>
+        </p:style>
+      </p:cxnSp>
+      <p:cxnSp>
+        <p:nvCxnSpPr>
+          <p:cNvPr id="42" name="Straight Arrow Connector 41">
+            <a:extLst>
+              <a:ext uri="{FF2B5EF4-FFF2-40B4-BE49-F238E27FC236}">
+                <a16:creationId xmlns:a16="http://schemas.microsoft.com/office/drawing/2014/main" id="{FDEEDB0E-2FB7-44C0-B44A-8E7035A95B3F}"/>
+              </a:ext>
+            </a:extLst>
+          </p:cNvPr>
+          <p:cNvCxnSpPr/>
+          <p:nvPr/>
+        </p:nvCxnSpPr>
+        <p:spPr>
+          <a:xfrm>
+            <a:off x="8395033" y="3471948"/>
+            <a:ext cx="162246" cy="0"/>
+          </a:xfrm>
+          <a:prstGeom prst="straightConnector1">
+            <a:avLst/>
+          </a:prstGeom>
+          <a:ln w="19050">
+            <a:headEnd type="none" w="med" len="med"/>
+            <a:tailEnd type="arrow" w="med" len="med"/>
           </a:ln>
         </p:spPr>
         <p:style>
@@ -5000,13 +5164,6 @@
   <p:clrMapOvr>
     <a:masterClrMapping/>
   </p:clrMapOvr>
-  <p:timing>
-    <p:tnLst>
-      <p:par>
-        <p:cTn id="1" dur="indefinite" restart="never" nodeType="tmRoot"/>
-      </p:par>
-    </p:tnLst>
-  </p:timing>
 </p:sld>
 </file>
 

</xml_diff>